<commit_message>
Updates to Angular unit testing presentation
</commit_message>
<xml_diff>
--- a/presentations/Introduction to Angular Unit Testing.pptx
+++ b/presentations/Introduction to Angular Unit Testing.pptx
@@ -20,7 +20,6 @@
     <p:sldId id="275" r:id="rId14"/>
     <p:sldId id="268" r:id="rId15"/>
     <p:sldId id="269" r:id="rId16"/>
-    <p:sldId id="279" r:id="rId17"/>
   </p:sldIdLst>
   <p:sldSz cx="12192000" cy="6858000"/>
   <p:notesSz cx="6858000" cy="9144000"/>
@@ -5931,173 +5930,6 @@
                                           <p:spTgt spid="3">
                                             <p:txEl>
                                               <p:pRg st="4" end="4"/>
-                                            </p:txEl>
-                                          </p:spTgt>
-                                        </p:tgtEl>
-                                        <p:attrNameLst>
-                                          <p:attrName>style.visibility</p:attrName>
-                                        </p:attrNameLst>
-                                      </p:cBhvr>
-                                      <p:to>
-                                        <p:strVal val="visible"/>
-                                      </p:to>
-                                    </p:set>
-                                  </p:childTnLst>
-                                </p:cTn>
-                              </p:par>
-                            </p:childTnLst>
-                          </p:cTn>
-                        </p:par>
-                      </p:childTnLst>
-                    </p:cTn>
-                  </p:par>
-                </p:childTnLst>
-              </p:cTn>
-              <p:prevCondLst>
-                <p:cond evt="onPrev" delay="0">
-                  <p:tgtEl>
-                    <p:sldTgt/>
-                  </p:tgtEl>
-                </p:cond>
-              </p:prevCondLst>
-              <p:nextCondLst>
-                <p:cond evt="onNext" delay="0">
-                  <p:tgtEl>
-                    <p:sldTgt/>
-                  </p:tgtEl>
-                </p:cond>
-              </p:nextCondLst>
-            </p:seq>
-          </p:childTnLst>
-        </p:cTn>
-      </p:par>
-    </p:tnLst>
-    <p:bldLst>
-      <p:bldP spid="3" grpId="0" build="p"/>
-    </p:bldLst>
-  </p:timing>
-</p:sld>
-</file>
-
-<file path=ppt/slides/slide16.xml><?xml version="1.0" encoding="utf-8"?>
-<p:sld xmlns:a="http://schemas.openxmlformats.org/drawingml/2006/main" xmlns:r="http://schemas.openxmlformats.org/officeDocument/2006/relationships" xmlns:p="http://schemas.openxmlformats.org/presentationml/2006/main">
-  <p:cSld>
-    <p:spTree>
-      <p:nvGrpSpPr>
-        <p:cNvPr id="1" name=""/>
-        <p:cNvGrpSpPr/>
-        <p:nvPr/>
-      </p:nvGrpSpPr>
-      <p:grpSpPr>
-        <a:xfrm>
-          <a:off x="0" y="0"/>
-          <a:ext cx="0" cy="0"/>
-          <a:chOff x="0" y="0"/>
-          <a:chExt cx="0" cy="0"/>
-        </a:xfrm>
-      </p:grpSpPr>
-      <p:sp>
-        <p:nvSpPr>
-          <p:cNvPr id="2" name="Title 1">
-            <a:extLst>
-              <a:ext uri="{FF2B5EF4-FFF2-40B4-BE49-F238E27FC236}">
-                <a16:creationId xmlns:a16="http://schemas.microsoft.com/office/drawing/2014/main" id="{B2C54165-ACA0-824C-AE70-28665D25AE96}"/>
-              </a:ext>
-            </a:extLst>
-          </p:cNvPr>
-          <p:cNvSpPr>
-            <a:spLocks noGrp="1"/>
-          </p:cNvSpPr>
-          <p:nvPr>
-            <p:ph type="title"/>
-          </p:nvPr>
-        </p:nvSpPr>
-        <p:spPr/>
-        <p:txBody>
-          <a:bodyPr/>
-          <a:lstStyle/>
-          <a:p>
-            <a:endParaRPr lang="en-US"/>
-          </a:p>
-        </p:txBody>
-      </p:sp>
-      <p:sp>
-        <p:nvSpPr>
-          <p:cNvPr id="3" name="Content Placeholder 2">
-            <a:extLst>
-              <a:ext uri="{FF2B5EF4-FFF2-40B4-BE49-F238E27FC236}">
-                <a16:creationId xmlns:a16="http://schemas.microsoft.com/office/drawing/2014/main" id="{3D0223D8-2EDF-B74E-8015-E56134B8098C}"/>
-              </a:ext>
-            </a:extLst>
-          </p:cNvPr>
-          <p:cNvSpPr>
-            <a:spLocks noGrp="1"/>
-          </p:cNvSpPr>
-          <p:nvPr>
-            <p:ph idx="1"/>
-          </p:nvPr>
-        </p:nvSpPr>
-        <p:spPr/>
-        <p:txBody>
-          <a:bodyPr/>
-          <a:lstStyle/>
-          <a:p>
-            <a:endParaRPr lang="en-US" dirty="0"/>
-          </a:p>
-        </p:txBody>
-      </p:sp>
-    </p:spTree>
-    <p:extLst>
-      <p:ext uri="{BB962C8B-B14F-4D97-AF65-F5344CB8AC3E}">
-        <p14:creationId xmlns:p14="http://schemas.microsoft.com/office/powerpoint/2010/main" val="2895332702"/>
-      </p:ext>
-    </p:extLst>
-  </p:cSld>
-  <p:clrMapOvr>
-    <a:masterClrMapping/>
-  </p:clrMapOvr>
-  <p:timing>
-    <p:tnLst>
-      <p:par>
-        <p:cTn id="1" dur="indefinite" restart="never" nodeType="tmRoot">
-          <p:childTnLst>
-            <p:seq concurrent="1" nextAc="seek">
-              <p:cTn id="2" dur="indefinite" nodeType="mainSeq">
-                <p:childTnLst>
-                  <p:par>
-                    <p:cTn id="3" fill="hold">
-                      <p:stCondLst>
-                        <p:cond delay="indefinite"/>
-                      </p:stCondLst>
-                      <p:childTnLst>
-                        <p:par>
-                          <p:cTn id="4" fill="hold">
-                            <p:stCondLst>
-                              <p:cond delay="0"/>
-                            </p:stCondLst>
-                            <p:childTnLst>
-                              <p:par>
-                                <p:cTn id="5" presetID="1" presetClass="entr" presetSubtype="0" fill="hold" grpId="0" nodeType="clickEffect" nodePh="1">
-                                  <p:stCondLst>
-                                    <p:cond delay="0"/>
-                                  </p:stCondLst>
-                                  <p:endCondLst>
-                                    <p:cond evt="begin" delay="0">
-                                      <p:tn val="5"/>
-                                    </p:cond>
-                                  </p:endCondLst>
-                                  <p:childTnLst>
-                                    <p:set>
-                                      <p:cBhvr>
-                                        <p:cTn id="6" dur="1" fill="hold">
-                                          <p:stCondLst>
-                                            <p:cond delay="0"/>
-                                          </p:stCondLst>
-                                        </p:cTn>
-                                        <p:tgtEl>
-                                          <p:spTgt spid="3">
-                                            <p:txEl>
-                                              <p:pRg st="0" end="0"/>
                                             </p:txEl>
                                           </p:spTgt>
                                         </p:tgtEl>

</xml_diff>

<commit_message>
Updating Angular unit testing support presentation
</commit_message>
<xml_diff>
--- a/presentations/Introduction to Angular Unit Testing.pptx
+++ b/presentations/Introduction to Angular Unit Testing.pptx
@@ -20,6 +20,9 @@
     <p:sldId id="275" r:id="rId14"/>
     <p:sldId id="268" r:id="rId15"/>
     <p:sldId id="269" r:id="rId16"/>
+    <p:sldId id="276" r:id="rId17"/>
+    <p:sldId id="277" r:id="rId18"/>
+    <p:sldId id="278" r:id="rId19"/>
   </p:sldIdLst>
   <p:sldSz cx="12192000" cy="6858000"/>
   <p:notesSz cx="6858000" cy="9144000"/>
@@ -273,7 +276,7 @@
           <a:p>
             <a:fld id="{B38EF465-D677-F140-82CD-891C0463380E}" type="datetimeFigureOut">
               <a:rPr lang="en-US" smtClean="0"/>
-              <a:t>11/16/21</a:t>
+              <a:t>11/17/21</a:t>
             </a:fld>
             <a:endParaRPr lang="en-US"/>
           </a:p>
@@ -471,7 +474,7 @@
           <a:p>
             <a:fld id="{B38EF465-D677-F140-82CD-891C0463380E}" type="datetimeFigureOut">
               <a:rPr lang="en-US" smtClean="0"/>
-              <a:t>11/16/21</a:t>
+              <a:t>11/17/21</a:t>
             </a:fld>
             <a:endParaRPr lang="en-US"/>
           </a:p>
@@ -679,7 +682,7 @@
           <a:p>
             <a:fld id="{B38EF465-D677-F140-82CD-891C0463380E}" type="datetimeFigureOut">
               <a:rPr lang="en-US" smtClean="0"/>
-              <a:t>11/16/21</a:t>
+              <a:t>11/17/21</a:t>
             </a:fld>
             <a:endParaRPr lang="en-US"/>
           </a:p>
@@ -877,7 +880,7 @@
           <a:p>
             <a:fld id="{B38EF465-D677-F140-82CD-891C0463380E}" type="datetimeFigureOut">
               <a:rPr lang="en-US" smtClean="0"/>
-              <a:t>11/16/21</a:t>
+              <a:t>11/17/21</a:t>
             </a:fld>
             <a:endParaRPr lang="en-US"/>
           </a:p>
@@ -1152,7 +1155,7 @@
           <a:p>
             <a:fld id="{B38EF465-D677-F140-82CD-891C0463380E}" type="datetimeFigureOut">
               <a:rPr lang="en-US" smtClean="0"/>
-              <a:t>11/16/21</a:t>
+              <a:t>11/17/21</a:t>
             </a:fld>
             <a:endParaRPr lang="en-US"/>
           </a:p>
@@ -1417,7 +1420,7 @@
           <a:p>
             <a:fld id="{B38EF465-D677-F140-82CD-891C0463380E}" type="datetimeFigureOut">
               <a:rPr lang="en-US" smtClean="0"/>
-              <a:t>11/16/21</a:t>
+              <a:t>11/17/21</a:t>
             </a:fld>
             <a:endParaRPr lang="en-US"/>
           </a:p>
@@ -1829,7 +1832,7 @@
           <a:p>
             <a:fld id="{B38EF465-D677-F140-82CD-891C0463380E}" type="datetimeFigureOut">
               <a:rPr lang="en-US" smtClean="0"/>
-              <a:t>11/16/21</a:t>
+              <a:t>11/17/21</a:t>
             </a:fld>
             <a:endParaRPr lang="en-US"/>
           </a:p>
@@ -1970,7 +1973,7 @@
           <a:p>
             <a:fld id="{B38EF465-D677-F140-82CD-891C0463380E}" type="datetimeFigureOut">
               <a:rPr lang="en-US" smtClean="0"/>
-              <a:t>11/16/21</a:t>
+              <a:t>11/17/21</a:t>
             </a:fld>
             <a:endParaRPr lang="en-US"/>
           </a:p>
@@ -2083,7 +2086,7 @@
           <a:p>
             <a:fld id="{B38EF465-D677-F140-82CD-891C0463380E}" type="datetimeFigureOut">
               <a:rPr lang="en-US" smtClean="0"/>
-              <a:t>11/16/21</a:t>
+              <a:t>11/17/21</a:t>
             </a:fld>
             <a:endParaRPr lang="en-US"/>
           </a:p>
@@ -2394,7 +2397,7 @@
           <a:p>
             <a:fld id="{B38EF465-D677-F140-82CD-891C0463380E}" type="datetimeFigureOut">
               <a:rPr lang="en-US" smtClean="0"/>
-              <a:t>11/16/21</a:t>
+              <a:t>11/17/21</a:t>
             </a:fld>
             <a:endParaRPr lang="en-US"/>
           </a:p>
@@ -2682,7 +2685,7 @@
           <a:p>
             <a:fld id="{B38EF465-D677-F140-82CD-891C0463380E}" type="datetimeFigureOut">
               <a:rPr lang="en-US" smtClean="0"/>
-              <a:t>11/16/21</a:t>
+              <a:t>11/17/21</a:t>
             </a:fld>
             <a:endParaRPr lang="en-US"/>
           </a:p>
@@ -2923,7 +2926,7 @@
           <a:p>
             <a:fld id="{B38EF465-D677-F140-82CD-891C0463380E}" type="datetimeFigureOut">
               <a:rPr lang="en-US" smtClean="0"/>
-              <a:t>11/16/21</a:t>
+              <a:t>11/17/21</a:t>
             </a:fld>
             <a:endParaRPr lang="en-US"/>
           </a:p>
@@ -5975,6 +5978,1086 @@
       <p:bldP spid="3" grpId="0" build="p"/>
     </p:bldLst>
   </p:timing>
+</p:sld>
+</file>
+
+<file path=ppt/slides/slide16.xml><?xml version="1.0" encoding="utf-8"?>
+<p:sld xmlns:a="http://schemas.openxmlformats.org/drawingml/2006/main" xmlns:r="http://schemas.openxmlformats.org/officeDocument/2006/relationships" xmlns:p="http://schemas.openxmlformats.org/presentationml/2006/main">
+  <p:cSld>
+    <p:spTree>
+      <p:nvGrpSpPr>
+        <p:cNvPr id="1" name=""/>
+        <p:cNvGrpSpPr/>
+        <p:nvPr/>
+      </p:nvGrpSpPr>
+      <p:grpSpPr>
+        <a:xfrm>
+          <a:off x="0" y="0"/>
+          <a:ext cx="0" cy="0"/>
+          <a:chOff x="0" y="0"/>
+          <a:chExt cx="0" cy="0"/>
+        </a:xfrm>
+      </p:grpSpPr>
+      <p:sp>
+        <p:nvSpPr>
+          <p:cNvPr id="2" name="Title 1">
+            <a:extLst>
+              <a:ext uri="{FF2B5EF4-FFF2-40B4-BE49-F238E27FC236}">
+                <a16:creationId xmlns:a16="http://schemas.microsoft.com/office/drawing/2014/main" id="{B2C54165-ACA0-824C-AE70-28665D25AE96}"/>
+              </a:ext>
+            </a:extLst>
+          </p:cNvPr>
+          <p:cNvSpPr>
+            <a:spLocks noGrp="1"/>
+          </p:cNvSpPr>
+          <p:nvPr>
+            <p:ph type="title"/>
+          </p:nvPr>
+        </p:nvSpPr>
+        <p:spPr/>
+        <p:txBody>
+          <a:bodyPr/>
+          <a:lstStyle/>
+          <a:p>
+            <a:r>
+              <a:rPr lang="en-US" dirty="0" err="1"/>
+              <a:t>HttpClientTestingModule</a:t>
+            </a:r>
+            <a:endParaRPr lang="en-US" dirty="0">
+              <a:latin typeface="Courier" pitchFamily="2" charset="0"/>
+            </a:endParaRPr>
+          </a:p>
+        </p:txBody>
+      </p:sp>
+      <p:sp>
+        <p:nvSpPr>
+          <p:cNvPr id="3" name="Content Placeholder 2">
+            <a:extLst>
+              <a:ext uri="{FF2B5EF4-FFF2-40B4-BE49-F238E27FC236}">
+                <a16:creationId xmlns:a16="http://schemas.microsoft.com/office/drawing/2014/main" id="{3D0223D8-2EDF-B74E-8015-E56134B8098C}"/>
+              </a:ext>
+            </a:extLst>
+          </p:cNvPr>
+          <p:cNvSpPr>
+            <a:spLocks noGrp="1"/>
+          </p:cNvSpPr>
+          <p:nvPr>
+            <p:ph idx="1"/>
+          </p:nvPr>
+        </p:nvSpPr>
+        <p:spPr/>
+        <p:txBody>
+          <a:bodyPr>
+            <a:normAutofit/>
+          </a:bodyPr>
+          <a:lstStyle/>
+          <a:p>
+            <a:r>
+              <a:rPr lang="en-US" dirty="0"/>
+              <a:t>Configures </a:t>
+            </a:r>
+            <a:r>
+              <a:rPr lang="en-US" dirty="0" err="1">
+                <a:latin typeface="Courier" pitchFamily="2" charset="0"/>
+              </a:rPr>
+              <a:t>HttpClientTestingBackend</a:t>
+            </a:r>
+            <a:r>
+              <a:rPr lang="en-US" dirty="0"/>
+              <a:t> as the </a:t>
+            </a:r>
+            <a:r>
+              <a:rPr lang="en-US" dirty="0" err="1">
+                <a:latin typeface="Courier" pitchFamily="2" charset="0"/>
+              </a:rPr>
+              <a:t>HttpBackend</a:t>
+            </a:r>
+            <a:r>
+              <a:rPr lang="en-US" dirty="0"/>
+              <a:t> used by </a:t>
+            </a:r>
+            <a:r>
+              <a:rPr lang="en-US" dirty="0" err="1">
+                <a:latin typeface="Courier" pitchFamily="2" charset="0"/>
+              </a:rPr>
+              <a:t>HttpClient</a:t>
+            </a:r>
+            <a:r>
+              <a:rPr lang="en-US" dirty="0"/>
+              <a:t>.</a:t>
+            </a:r>
+          </a:p>
+          <a:p>
+            <a:r>
+              <a:rPr lang="en-US" dirty="0" err="1"/>
+              <a:t>Angular's</a:t>
+            </a:r>
+            <a:r>
+              <a:rPr lang="en-US" dirty="0"/>
+              <a:t> HTTP testing library is designed for a pattern of testing: </a:t>
+            </a:r>
+          </a:p>
+          <a:p>
+            <a:pPr lvl="1"/>
+            <a:r>
+              <a:rPr lang="en-US" dirty="0"/>
+              <a:t>The app executes code and makes requests first. </a:t>
+            </a:r>
+          </a:p>
+          <a:p>
+            <a:pPr lvl="1"/>
+            <a:r>
+              <a:rPr lang="en-US" dirty="0"/>
+              <a:t>The test then expects that certain requests have or have not been made, performs assertions against those requests, and finally provides responses by "flushing" each expected request.</a:t>
+            </a:r>
+          </a:p>
+          <a:p>
+            <a:pPr lvl="1"/>
+            <a:r>
+              <a:rPr lang="en-US" dirty="0"/>
+              <a:t>At the end, tests can verify that the app made no unexpected requests.</a:t>
+            </a:r>
+          </a:p>
+          <a:p>
+            <a:r>
+              <a:rPr lang="en-US" dirty="0"/>
+              <a:t>The </a:t>
+            </a:r>
+            <a:r>
+              <a:rPr lang="en-US" dirty="0" err="1">
+                <a:latin typeface="Courier" pitchFamily="2" charset="0"/>
+              </a:rPr>
+              <a:t>HttpTestingController</a:t>
+            </a:r>
+            <a:r>
+              <a:rPr lang="en-US" dirty="0"/>
+              <a:t> is the mocking controller.</a:t>
+            </a:r>
+          </a:p>
+        </p:txBody>
+      </p:sp>
+    </p:spTree>
+    <p:extLst>
+      <p:ext uri="{BB962C8B-B14F-4D97-AF65-F5344CB8AC3E}">
+        <p14:creationId xmlns:p14="http://schemas.microsoft.com/office/powerpoint/2010/main" val="2502507513"/>
+      </p:ext>
+    </p:extLst>
+  </p:cSld>
+  <p:clrMapOvr>
+    <a:masterClrMapping/>
+  </p:clrMapOvr>
+</p:sld>
+</file>
+
+<file path=ppt/slides/slide17.xml><?xml version="1.0" encoding="utf-8"?>
+<p:sld xmlns:a="http://schemas.openxmlformats.org/drawingml/2006/main" xmlns:r="http://schemas.openxmlformats.org/officeDocument/2006/relationships" xmlns:p="http://schemas.openxmlformats.org/presentationml/2006/main">
+  <p:cSld>
+    <p:spTree>
+      <p:nvGrpSpPr>
+        <p:cNvPr id="1" name=""/>
+        <p:cNvGrpSpPr/>
+        <p:nvPr/>
+      </p:nvGrpSpPr>
+      <p:grpSpPr>
+        <a:xfrm>
+          <a:off x="0" y="0"/>
+          <a:ext cx="0" cy="0"/>
+          <a:chOff x="0" y="0"/>
+          <a:chExt cx="0" cy="0"/>
+        </a:xfrm>
+      </p:grpSpPr>
+      <p:sp>
+        <p:nvSpPr>
+          <p:cNvPr id="3" name="Content Placeholder 2">
+            <a:extLst>
+              <a:ext uri="{FF2B5EF4-FFF2-40B4-BE49-F238E27FC236}">
+                <a16:creationId xmlns:a16="http://schemas.microsoft.com/office/drawing/2014/main" id="{9B8707AB-0505-AC4A-81E0-0C8FA850253A}"/>
+              </a:ext>
+            </a:extLst>
+          </p:cNvPr>
+          <p:cNvSpPr>
+            <a:spLocks noGrp="1"/>
+          </p:cNvSpPr>
+          <p:nvPr>
+            <p:ph idx="1"/>
+          </p:nvPr>
+        </p:nvSpPr>
+        <p:spPr/>
+        <p:txBody>
+          <a:bodyPr>
+            <a:normAutofit fontScale="92500" lnSpcReduction="10000"/>
+          </a:bodyPr>
+          <a:lstStyle/>
+          <a:p>
+            <a:pPr marL="0" indent="0">
+              <a:buNone/>
+            </a:pPr>
+            <a:r>
+              <a:rPr lang="en-US" sz="2400" dirty="0">
+                <a:solidFill>
+                  <a:schemeClr val="accent1"/>
+                </a:solidFill>
+                <a:latin typeface="Courier" pitchFamily="2" charset="0"/>
+              </a:rPr>
+              <a:t>import</a:t>
+            </a:r>
+            <a:r>
+              <a:rPr lang="en-US" sz="2400" dirty="0">
+                <a:latin typeface="Courier" pitchFamily="2" charset="0"/>
+              </a:rPr>
+              <a:t> { </a:t>
+            </a:r>
+            <a:br>
+              <a:rPr lang="en-US" sz="2400" dirty="0">
+                <a:latin typeface="Courier" pitchFamily="2" charset="0"/>
+              </a:rPr>
+            </a:br>
+            <a:r>
+              <a:rPr lang="en-US" sz="2400" dirty="0">
+                <a:latin typeface="Courier" pitchFamily="2" charset="0"/>
+              </a:rPr>
+              <a:t>   </a:t>
+            </a:r>
+            <a:r>
+              <a:rPr lang="en-US" sz="2400" dirty="0" err="1">
+                <a:latin typeface="Courier" pitchFamily="2" charset="0"/>
+              </a:rPr>
+              <a:t>HttpClientTestingModule</a:t>
+            </a:r>
+            <a:r>
+              <a:rPr lang="en-US" sz="2400" dirty="0">
+                <a:latin typeface="Courier" pitchFamily="2" charset="0"/>
+              </a:rPr>
+              <a:t>, </a:t>
+            </a:r>
+            <a:br>
+              <a:rPr lang="en-US" sz="2400" dirty="0">
+                <a:latin typeface="Courier" pitchFamily="2" charset="0"/>
+              </a:rPr>
+            </a:br>
+            <a:r>
+              <a:rPr lang="en-US" sz="2400" dirty="0">
+                <a:latin typeface="Courier" pitchFamily="2" charset="0"/>
+              </a:rPr>
+              <a:t>   </a:t>
+            </a:r>
+            <a:r>
+              <a:rPr lang="en-US" sz="2400" dirty="0" err="1">
+                <a:latin typeface="Courier" pitchFamily="2" charset="0"/>
+              </a:rPr>
+              <a:t>HttpTestingController</a:t>
+            </a:r>
+            <a:r>
+              <a:rPr lang="en-US" sz="2400" dirty="0">
+                <a:latin typeface="Courier" pitchFamily="2" charset="0"/>
+              </a:rPr>
+              <a:t> </a:t>
+            </a:r>
+            <a:br>
+              <a:rPr lang="en-US" sz="2400" dirty="0">
+                <a:latin typeface="Courier" pitchFamily="2" charset="0"/>
+              </a:rPr>
+            </a:br>
+            <a:r>
+              <a:rPr lang="en-US" sz="2400" dirty="0">
+                <a:latin typeface="Courier" pitchFamily="2" charset="0"/>
+              </a:rPr>
+              <a:t>} </a:t>
+            </a:r>
+            <a:r>
+              <a:rPr lang="en-US" sz="2400" dirty="0">
+                <a:solidFill>
+                  <a:schemeClr val="accent1"/>
+                </a:solidFill>
+                <a:latin typeface="Courier" pitchFamily="2" charset="0"/>
+              </a:rPr>
+              <a:t>from</a:t>
+            </a:r>
+            <a:r>
+              <a:rPr lang="en-US" sz="2400" dirty="0">
+                <a:latin typeface="Courier" pitchFamily="2" charset="0"/>
+              </a:rPr>
+              <a:t> </a:t>
+            </a:r>
+            <a:r>
+              <a:rPr lang="en-US" sz="2400" dirty="0">
+                <a:solidFill>
+                  <a:schemeClr val="accent6">
+                    <a:lumMod val="75000"/>
+                  </a:schemeClr>
+                </a:solidFill>
+                <a:latin typeface="Courier" pitchFamily="2" charset="0"/>
+              </a:rPr>
+              <a:t>'@angular/common/http/testing’</a:t>
+            </a:r>
+            <a:r>
+              <a:rPr lang="en-US" sz="2400" dirty="0">
+                <a:latin typeface="Courier" pitchFamily="2" charset="0"/>
+              </a:rPr>
+              <a:t>;</a:t>
+            </a:r>
+          </a:p>
+          <a:p>
+            <a:pPr marL="0" indent="0">
+              <a:buNone/>
+            </a:pPr>
+            <a:br>
+              <a:rPr lang="en-US" sz="2400" dirty="0">
+                <a:latin typeface="Courier" pitchFamily="2" charset="0"/>
+              </a:rPr>
+            </a:br>
+            <a:r>
+              <a:rPr lang="en-US" sz="2400" dirty="0" err="1">
+                <a:solidFill>
+                  <a:schemeClr val="accent2">
+                    <a:lumMod val="75000"/>
+                  </a:schemeClr>
+                </a:solidFill>
+                <a:latin typeface="Courier" pitchFamily="2" charset="0"/>
+              </a:rPr>
+              <a:t>beforeEach</a:t>
+            </a:r>
+            <a:r>
+              <a:rPr lang="en-US" sz="2400" dirty="0">
+                <a:latin typeface="Courier" pitchFamily="2" charset="0"/>
+              </a:rPr>
+              <a:t>(() =&gt; {</a:t>
+            </a:r>
+            <a:br>
+              <a:rPr lang="en-US" sz="2400" dirty="0">
+                <a:latin typeface="Courier" pitchFamily="2" charset="0"/>
+              </a:rPr>
+            </a:br>
+            <a:r>
+              <a:rPr lang="en-US" sz="2400" dirty="0">
+                <a:latin typeface="Courier" pitchFamily="2" charset="0"/>
+              </a:rPr>
+              <a:t>   </a:t>
+            </a:r>
+            <a:r>
+              <a:rPr lang="en-US" sz="2400" dirty="0" err="1">
+                <a:latin typeface="Courier" pitchFamily="2" charset="0"/>
+              </a:rPr>
+              <a:t>TestBed.configureTestingModule</a:t>
+            </a:r>
+            <a:r>
+              <a:rPr lang="en-US" sz="2400" dirty="0">
+                <a:latin typeface="Courier" pitchFamily="2" charset="0"/>
+              </a:rPr>
+              <a:t>({</a:t>
+            </a:r>
+            <a:br>
+              <a:rPr lang="en-US" sz="2400" dirty="0">
+                <a:latin typeface="Courier" pitchFamily="2" charset="0"/>
+              </a:rPr>
+            </a:br>
+            <a:r>
+              <a:rPr lang="en-US" sz="2400" dirty="0">
+                <a:latin typeface="Courier" pitchFamily="2" charset="0"/>
+              </a:rPr>
+              <a:t>      </a:t>
+            </a:r>
+            <a:r>
+              <a:rPr lang="en-US" sz="2400" b="1" dirty="0">
+                <a:solidFill>
+                  <a:schemeClr val="accent1">
+                    <a:lumMod val="75000"/>
+                  </a:schemeClr>
+                </a:solidFill>
+                <a:latin typeface="Courier" pitchFamily="2" charset="0"/>
+              </a:rPr>
+              <a:t>imports: [</a:t>
+            </a:r>
+            <a:r>
+              <a:rPr lang="en-US" sz="2400" b="1" dirty="0" err="1">
+                <a:solidFill>
+                  <a:srgbClr val="7030A0"/>
+                </a:solidFill>
+                <a:latin typeface="Courier" pitchFamily="2" charset="0"/>
+              </a:rPr>
+              <a:t>HttpClientTestingModule</a:t>
+            </a:r>
+            <a:r>
+              <a:rPr lang="en-US" sz="2400" b="1" dirty="0">
+                <a:solidFill>
+                  <a:schemeClr val="accent1">
+                    <a:lumMod val="75000"/>
+                  </a:schemeClr>
+                </a:solidFill>
+                <a:latin typeface="Courier" pitchFamily="2" charset="0"/>
+              </a:rPr>
+              <a:t>]</a:t>
+            </a:r>
+            <a:r>
+              <a:rPr lang="en-US" sz="2400" dirty="0">
+                <a:latin typeface="Courier" pitchFamily="2" charset="0"/>
+              </a:rPr>
+              <a:t>, </a:t>
+            </a:r>
+            <a:br>
+              <a:rPr lang="en-US" sz="2400" dirty="0">
+                <a:latin typeface="Courier" pitchFamily="2" charset="0"/>
+              </a:rPr>
+            </a:br>
+            <a:r>
+              <a:rPr lang="en-US" sz="2400" dirty="0">
+                <a:latin typeface="Courier" pitchFamily="2" charset="0"/>
+              </a:rPr>
+              <a:t>      providers: [</a:t>
+            </a:r>
+            <a:r>
+              <a:rPr lang="en-US" sz="2400" dirty="0" err="1">
+                <a:latin typeface="Courier" pitchFamily="2" charset="0"/>
+              </a:rPr>
+              <a:t>EarthquakeDataService</a:t>
+            </a:r>
+            <a:r>
+              <a:rPr lang="en-US" sz="2400" dirty="0">
+                <a:latin typeface="Courier" pitchFamily="2" charset="0"/>
+              </a:rPr>
+              <a:t>],</a:t>
+            </a:r>
+            <a:br>
+              <a:rPr lang="en-US" sz="2400" dirty="0">
+                <a:latin typeface="Courier" pitchFamily="2" charset="0"/>
+              </a:rPr>
+            </a:br>
+            <a:r>
+              <a:rPr lang="en-US" sz="2400" dirty="0">
+                <a:latin typeface="Courier" pitchFamily="2" charset="0"/>
+              </a:rPr>
+              <a:t>   }); </a:t>
+            </a:r>
+            <a:br>
+              <a:rPr lang="en-US" sz="2400" dirty="0">
+                <a:latin typeface="Courier" pitchFamily="2" charset="0"/>
+              </a:rPr>
+            </a:br>
+            <a:r>
+              <a:rPr lang="en-US" sz="2400" dirty="0">
+                <a:latin typeface="Courier" pitchFamily="2" charset="0"/>
+              </a:rPr>
+              <a:t>   service = </a:t>
+            </a:r>
+            <a:r>
+              <a:rPr lang="en-US" sz="2400" b="1" dirty="0" err="1">
+                <a:solidFill>
+                  <a:schemeClr val="accent1">
+                    <a:lumMod val="75000"/>
+                  </a:schemeClr>
+                </a:solidFill>
+                <a:latin typeface="Courier" pitchFamily="2" charset="0"/>
+              </a:rPr>
+              <a:t>TestBed.inject</a:t>
+            </a:r>
+            <a:r>
+              <a:rPr lang="en-US" sz="2400" dirty="0">
+                <a:latin typeface="Courier" pitchFamily="2" charset="0"/>
+              </a:rPr>
+              <a:t>(</a:t>
+            </a:r>
+            <a:r>
+              <a:rPr lang="en-US" sz="2400" dirty="0" err="1">
+                <a:latin typeface="Courier" pitchFamily="2" charset="0"/>
+              </a:rPr>
+              <a:t>EarthquakeDataService</a:t>
+            </a:r>
+            <a:r>
+              <a:rPr lang="en-US" sz="2400" dirty="0">
+                <a:latin typeface="Courier" pitchFamily="2" charset="0"/>
+              </a:rPr>
+              <a:t>); </a:t>
+            </a:r>
+            <a:br>
+              <a:rPr lang="en-US" sz="2400" dirty="0">
+                <a:latin typeface="Courier" pitchFamily="2" charset="0"/>
+              </a:rPr>
+            </a:br>
+            <a:r>
+              <a:rPr lang="en-US" sz="2400" dirty="0">
+                <a:latin typeface="Courier" pitchFamily="2" charset="0"/>
+              </a:rPr>
+              <a:t>   </a:t>
+            </a:r>
+            <a:r>
+              <a:rPr lang="en-US" sz="2400" dirty="0" err="1">
+                <a:latin typeface="Courier" pitchFamily="2" charset="0"/>
+              </a:rPr>
+              <a:t>httpTestingController</a:t>
+            </a:r>
+            <a:r>
+              <a:rPr lang="en-US" sz="2400" dirty="0">
+                <a:latin typeface="Courier" pitchFamily="2" charset="0"/>
+              </a:rPr>
+              <a:t> = </a:t>
+            </a:r>
+            <a:br>
+              <a:rPr lang="en-US" sz="2400" dirty="0">
+                <a:latin typeface="Courier" pitchFamily="2" charset="0"/>
+              </a:rPr>
+            </a:br>
+            <a:r>
+              <a:rPr lang="en-US" sz="2400" dirty="0">
+                <a:latin typeface="Courier" pitchFamily="2" charset="0"/>
+              </a:rPr>
+              <a:t>		</a:t>
+            </a:r>
+            <a:r>
+              <a:rPr lang="en-US" sz="2400" b="1" dirty="0" err="1">
+                <a:solidFill>
+                  <a:schemeClr val="accent1">
+                    <a:lumMod val="75000"/>
+                  </a:schemeClr>
+                </a:solidFill>
+                <a:latin typeface="Courier" pitchFamily="2" charset="0"/>
+              </a:rPr>
+              <a:t>TestBed.inject</a:t>
+            </a:r>
+            <a:r>
+              <a:rPr lang="en-US" sz="2400" dirty="0">
+                <a:latin typeface="Courier" pitchFamily="2" charset="0"/>
+              </a:rPr>
+              <a:t>(</a:t>
+            </a:r>
+            <a:r>
+              <a:rPr lang="en-US" sz="2400" b="1" dirty="0" err="1">
+                <a:solidFill>
+                  <a:srgbClr val="7030A0"/>
+                </a:solidFill>
+                <a:latin typeface="Courier" pitchFamily="2" charset="0"/>
+              </a:rPr>
+              <a:t>HttpTestingController</a:t>
+            </a:r>
+            <a:r>
+              <a:rPr lang="en-US" sz="2400" dirty="0">
+                <a:latin typeface="Courier" pitchFamily="2" charset="0"/>
+              </a:rPr>
+              <a:t>);</a:t>
+            </a:r>
+            <a:br>
+              <a:rPr lang="en-US" sz="2400" dirty="0">
+                <a:latin typeface="Courier" pitchFamily="2" charset="0"/>
+              </a:rPr>
+            </a:br>
+            <a:r>
+              <a:rPr lang="en-US" sz="2400" dirty="0">
+                <a:latin typeface="Courier" pitchFamily="2" charset="0"/>
+              </a:rPr>
+              <a:t>});</a:t>
+            </a:r>
+          </a:p>
+        </p:txBody>
+      </p:sp>
+      <p:sp>
+        <p:nvSpPr>
+          <p:cNvPr id="2" name="Title 1">
+            <a:extLst>
+              <a:ext uri="{FF2B5EF4-FFF2-40B4-BE49-F238E27FC236}">
+                <a16:creationId xmlns:a16="http://schemas.microsoft.com/office/drawing/2014/main" id="{83E142E2-C28C-DF46-841B-A0B2C39B71FA}"/>
+              </a:ext>
+            </a:extLst>
+          </p:cNvPr>
+          <p:cNvSpPr>
+            <a:spLocks noGrp="1"/>
+          </p:cNvSpPr>
+          <p:nvPr>
+            <p:ph type="title"/>
+          </p:nvPr>
+        </p:nvSpPr>
+        <p:spPr/>
+        <p:txBody>
+          <a:bodyPr/>
+          <a:lstStyle/>
+          <a:p>
+            <a:r>
+              <a:rPr lang="en-US" dirty="0"/>
+              <a:t>Using the </a:t>
+            </a:r>
+            <a:r>
+              <a:rPr lang="en-US" dirty="0" err="1">
+                <a:latin typeface="Courier" pitchFamily="2" charset="0"/>
+              </a:rPr>
+              <a:t>HttpClientTestingModule</a:t>
+            </a:r>
+            <a:endParaRPr lang="en-US" dirty="0">
+              <a:latin typeface="Courier" pitchFamily="2" charset="0"/>
+            </a:endParaRPr>
+          </a:p>
+        </p:txBody>
+      </p:sp>
+    </p:spTree>
+    <p:extLst>
+      <p:ext uri="{BB962C8B-B14F-4D97-AF65-F5344CB8AC3E}">
+        <p14:creationId xmlns:p14="http://schemas.microsoft.com/office/powerpoint/2010/main" val="529304857"/>
+      </p:ext>
+    </p:extLst>
+  </p:cSld>
+  <p:clrMapOvr>
+    <a:masterClrMapping/>
+  </p:clrMapOvr>
+</p:sld>
+</file>
+
+<file path=ppt/slides/slide18.xml><?xml version="1.0" encoding="utf-8"?>
+<p:sld xmlns:a="http://schemas.openxmlformats.org/drawingml/2006/main" xmlns:r="http://schemas.openxmlformats.org/officeDocument/2006/relationships" xmlns:p="http://schemas.openxmlformats.org/presentationml/2006/main">
+  <p:cSld>
+    <p:spTree>
+      <p:nvGrpSpPr>
+        <p:cNvPr id="1" name=""/>
+        <p:cNvGrpSpPr/>
+        <p:nvPr/>
+      </p:nvGrpSpPr>
+      <p:grpSpPr>
+        <a:xfrm>
+          <a:off x="0" y="0"/>
+          <a:ext cx="0" cy="0"/>
+          <a:chOff x="0" y="0"/>
+          <a:chExt cx="0" cy="0"/>
+        </a:xfrm>
+      </p:grpSpPr>
+      <p:sp>
+        <p:nvSpPr>
+          <p:cNvPr id="2" name="Title 1">
+            <a:extLst>
+              <a:ext uri="{FF2B5EF4-FFF2-40B4-BE49-F238E27FC236}">
+                <a16:creationId xmlns:a16="http://schemas.microsoft.com/office/drawing/2014/main" id="{83E142E2-C28C-DF46-841B-A0B2C39B71FA}"/>
+              </a:ext>
+            </a:extLst>
+          </p:cNvPr>
+          <p:cNvSpPr>
+            <a:spLocks noGrp="1"/>
+          </p:cNvSpPr>
+          <p:nvPr>
+            <p:ph type="title"/>
+          </p:nvPr>
+        </p:nvSpPr>
+        <p:spPr/>
+        <p:txBody>
+          <a:bodyPr/>
+          <a:lstStyle/>
+          <a:p>
+            <a:r>
+              <a:rPr lang="en-US" dirty="0"/>
+              <a:t>Using the </a:t>
+            </a:r>
+            <a:r>
+              <a:rPr lang="en-US" dirty="0" err="1">
+                <a:latin typeface="Courier" pitchFamily="2" charset="0"/>
+              </a:rPr>
+              <a:t>HttpTestingController</a:t>
+            </a:r>
+            <a:endParaRPr lang="en-US" dirty="0">
+              <a:latin typeface="Courier" pitchFamily="2" charset="0"/>
+            </a:endParaRPr>
+          </a:p>
+        </p:txBody>
+      </p:sp>
+      <p:sp>
+        <p:nvSpPr>
+          <p:cNvPr id="3" name="Content Placeholder 2">
+            <a:extLst>
+              <a:ext uri="{FF2B5EF4-FFF2-40B4-BE49-F238E27FC236}">
+                <a16:creationId xmlns:a16="http://schemas.microsoft.com/office/drawing/2014/main" id="{9B8707AB-0505-AC4A-81E0-0C8FA850253A}"/>
+              </a:ext>
+            </a:extLst>
+          </p:cNvPr>
+          <p:cNvSpPr>
+            <a:spLocks noGrp="1"/>
+          </p:cNvSpPr>
+          <p:nvPr>
+            <p:ph idx="1"/>
+          </p:nvPr>
+        </p:nvSpPr>
+        <p:spPr/>
+        <p:txBody>
+          <a:bodyPr>
+            <a:normAutofit lnSpcReduction="10000"/>
+          </a:bodyPr>
+          <a:lstStyle/>
+          <a:p>
+            <a:pPr marL="0" indent="0">
+              <a:buNone/>
+            </a:pPr>
+            <a:r>
+              <a:rPr lang="en-US" sz="2400" dirty="0" err="1">
+                <a:solidFill>
+                  <a:schemeClr val="accent2">
+                    <a:lumMod val="75000"/>
+                  </a:schemeClr>
+                </a:solidFill>
+                <a:latin typeface="Courier" pitchFamily="2" charset="0"/>
+              </a:rPr>
+              <a:t>afterEach</a:t>
+            </a:r>
+            <a:r>
+              <a:rPr lang="en-US" sz="2400" dirty="0">
+                <a:latin typeface="Courier" pitchFamily="2" charset="0"/>
+              </a:rPr>
+              <a:t>(() =&gt; { </a:t>
+            </a:r>
+            <a:r>
+              <a:rPr lang="en-US" sz="2400" b="1" dirty="0" err="1">
+                <a:solidFill>
+                  <a:schemeClr val="accent1">
+                    <a:lumMod val="75000"/>
+                  </a:schemeClr>
+                </a:solidFill>
+                <a:latin typeface="Courier" pitchFamily="2" charset="0"/>
+              </a:rPr>
+              <a:t>httpTestingController.verify</a:t>
+            </a:r>
+            <a:r>
+              <a:rPr lang="en-US" sz="2400" b="1" dirty="0">
+                <a:solidFill>
+                  <a:schemeClr val="accent1">
+                    <a:lumMod val="75000"/>
+                  </a:schemeClr>
+                </a:solidFill>
+                <a:latin typeface="Courier" pitchFamily="2" charset="0"/>
+              </a:rPr>
+              <a:t>()</a:t>
+            </a:r>
+            <a:r>
+              <a:rPr lang="en-US" sz="2400" dirty="0">
+                <a:latin typeface="Courier" pitchFamily="2" charset="0"/>
+              </a:rPr>
+              <a:t>; });</a:t>
+            </a:r>
+            <a:br>
+              <a:rPr lang="en-US" sz="2400" dirty="0">
+                <a:latin typeface="Courier" pitchFamily="2" charset="0"/>
+              </a:rPr>
+            </a:br>
+            <a:br>
+              <a:rPr lang="en-US" sz="2400" dirty="0">
+                <a:latin typeface="Courier" pitchFamily="2" charset="0"/>
+              </a:rPr>
+            </a:br>
+            <a:r>
+              <a:rPr lang="en-US" sz="2400" dirty="0" err="1">
+                <a:solidFill>
+                  <a:schemeClr val="accent2">
+                    <a:lumMod val="75000"/>
+                  </a:schemeClr>
+                </a:solidFill>
+                <a:latin typeface="Courier" pitchFamily="2" charset="0"/>
+              </a:rPr>
+              <a:t>beforeEach</a:t>
+            </a:r>
+            <a:r>
+              <a:rPr lang="en-US" sz="2400" dirty="0">
+                <a:latin typeface="Courier" pitchFamily="2" charset="0"/>
+              </a:rPr>
+              <a:t>((done: </a:t>
+            </a:r>
+            <a:r>
+              <a:rPr lang="en-US" sz="2400" dirty="0" err="1">
+                <a:solidFill>
+                  <a:srgbClr val="7030A0"/>
+                </a:solidFill>
+                <a:latin typeface="Courier" pitchFamily="2" charset="0"/>
+              </a:rPr>
+              <a:t>DoneFn</a:t>
+            </a:r>
+            <a:r>
+              <a:rPr lang="en-US" sz="2400" dirty="0">
+                <a:latin typeface="Courier" pitchFamily="2" charset="0"/>
+              </a:rPr>
+              <a:t>) =&gt; {</a:t>
+            </a:r>
+            <a:br>
+              <a:rPr lang="en-US" sz="2400" dirty="0">
+                <a:latin typeface="Courier" pitchFamily="2" charset="0"/>
+              </a:rPr>
+            </a:br>
+            <a:r>
+              <a:rPr lang="en-US" sz="2400" dirty="0">
+                <a:latin typeface="Courier" pitchFamily="2" charset="0"/>
+              </a:rPr>
+              <a:t>   </a:t>
+            </a:r>
+            <a:r>
+              <a:rPr lang="en-US" sz="2400" dirty="0">
+                <a:solidFill>
+                  <a:schemeClr val="bg1">
+                    <a:lumMod val="65000"/>
+                  </a:schemeClr>
+                </a:solidFill>
+                <a:latin typeface="Courier" pitchFamily="2" charset="0"/>
+              </a:rPr>
+              <a:t>// Execute the SUT, subscribing to Observable</a:t>
+            </a:r>
+            <a:br>
+              <a:rPr lang="en-US" sz="2400" dirty="0">
+                <a:solidFill>
+                  <a:schemeClr val="bg1">
+                    <a:lumMod val="65000"/>
+                  </a:schemeClr>
+                </a:solidFill>
+                <a:latin typeface="Courier" pitchFamily="2" charset="0"/>
+              </a:rPr>
+            </a:br>
+            <a:r>
+              <a:rPr lang="en-US" sz="2400" dirty="0">
+                <a:latin typeface="Courier" pitchFamily="2" charset="0"/>
+              </a:rPr>
+              <a:t>   </a:t>
+            </a:r>
+            <a:r>
+              <a:rPr lang="en-US" sz="2400" dirty="0" err="1">
+                <a:latin typeface="Courier" pitchFamily="2" charset="0"/>
+              </a:rPr>
+              <a:t>service.query</a:t>
+            </a:r>
+            <a:r>
+              <a:rPr lang="en-US" sz="2400" dirty="0">
+                <a:latin typeface="Courier" pitchFamily="2" charset="0"/>
+              </a:rPr>
+              <a:t>(</a:t>
+            </a:r>
+            <a:r>
+              <a:rPr lang="en-US" sz="2400" dirty="0" err="1">
+                <a:latin typeface="Courier" pitchFamily="2" charset="0"/>
+              </a:rPr>
+              <a:t>startDateTime</a:t>
+            </a:r>
+            <a:r>
+              <a:rPr lang="en-US" sz="2400" dirty="0">
+                <a:latin typeface="Courier" pitchFamily="2" charset="0"/>
+              </a:rPr>
+              <a:t>, </a:t>
+            </a:r>
+            <a:r>
+              <a:rPr lang="en-US" sz="2400" dirty="0" err="1">
+                <a:latin typeface="Courier" pitchFamily="2" charset="0"/>
+              </a:rPr>
+              <a:t>endDateTime</a:t>
+            </a:r>
+            <a:r>
+              <a:rPr lang="en-US" sz="2400" dirty="0">
+                <a:latin typeface="Courier" pitchFamily="2" charset="0"/>
+              </a:rPr>
+              <a:t>).subscribe(</a:t>
+            </a:r>
+            <a:br>
+              <a:rPr lang="en-US" sz="2400" dirty="0">
+                <a:latin typeface="Courier" pitchFamily="2" charset="0"/>
+              </a:rPr>
+            </a:br>
+            <a:r>
+              <a:rPr lang="en-US" sz="2400" dirty="0">
+                <a:latin typeface="Courier" pitchFamily="2" charset="0"/>
+              </a:rPr>
+              <a:t>      (data) =&gt; { captured = data; done(); },</a:t>
+            </a:r>
+            <a:br>
+              <a:rPr lang="en-US" sz="2400" dirty="0">
+                <a:latin typeface="Courier" pitchFamily="2" charset="0"/>
+              </a:rPr>
+            </a:br>
+            <a:r>
+              <a:rPr lang="en-US" sz="2400" dirty="0">
+                <a:latin typeface="Courier" pitchFamily="2" charset="0"/>
+              </a:rPr>
+              <a:t>      (error) =&gt; { </a:t>
+            </a:r>
+            <a:r>
+              <a:rPr lang="en-US" sz="2400" dirty="0" err="1">
+                <a:latin typeface="Courier" pitchFamily="2" charset="0"/>
+              </a:rPr>
+              <a:t>capturedError</a:t>
+            </a:r>
+            <a:r>
+              <a:rPr lang="en-US" sz="2400" dirty="0">
+                <a:latin typeface="Courier" pitchFamily="2" charset="0"/>
+              </a:rPr>
+              <a:t> = error; done(); }</a:t>
+            </a:r>
+            <a:br>
+              <a:rPr lang="en-US" sz="2400" dirty="0">
+                <a:latin typeface="Courier" pitchFamily="2" charset="0"/>
+              </a:rPr>
+            </a:br>
+            <a:r>
+              <a:rPr lang="en-US" sz="2400" dirty="0">
+                <a:latin typeface="Courier" pitchFamily="2" charset="0"/>
+              </a:rPr>
+              <a:t>   );</a:t>
+            </a:r>
+            <a:br>
+              <a:rPr lang="en-US" sz="2400" dirty="0">
+                <a:latin typeface="Courier" pitchFamily="2" charset="0"/>
+              </a:rPr>
+            </a:br>
+            <a:r>
+              <a:rPr lang="en-US" sz="2400" dirty="0">
+                <a:latin typeface="Courier" pitchFamily="2" charset="0"/>
+              </a:rPr>
+              <a:t>   </a:t>
+            </a:r>
+            <a:r>
+              <a:rPr lang="en-US" sz="2400" dirty="0">
+                <a:solidFill>
+                  <a:schemeClr val="bg1">
+                    <a:lumMod val="65000"/>
+                  </a:schemeClr>
+                </a:solidFill>
+                <a:latin typeface="Courier" pitchFamily="2" charset="0"/>
+              </a:rPr>
+              <a:t>// Set expectation on the </a:t>
+            </a:r>
+            <a:r>
+              <a:rPr lang="en-US" sz="2400" dirty="0" err="1">
+                <a:solidFill>
+                  <a:schemeClr val="bg1">
+                    <a:lumMod val="65000"/>
+                  </a:schemeClr>
+                </a:solidFill>
+                <a:latin typeface="Courier" pitchFamily="2" charset="0"/>
+              </a:rPr>
+              <a:t>HttpTestingController</a:t>
+            </a:r>
+            <a:br>
+              <a:rPr lang="en-US" sz="2400" dirty="0">
+                <a:solidFill>
+                  <a:schemeClr val="bg1">
+                    <a:lumMod val="65000"/>
+                  </a:schemeClr>
+                </a:solidFill>
+                <a:latin typeface="Courier" pitchFamily="2" charset="0"/>
+              </a:rPr>
+            </a:br>
+            <a:r>
+              <a:rPr lang="en-US" sz="2400" dirty="0">
+                <a:solidFill>
+                  <a:schemeClr val="bg1">
+                    <a:lumMod val="65000"/>
+                  </a:schemeClr>
+                </a:solidFill>
+                <a:latin typeface="Courier" pitchFamily="2" charset="0"/>
+              </a:rPr>
+              <a:t>   // and flush the Observable from the </a:t>
+            </a:r>
+            <a:r>
+              <a:rPr lang="en-US" sz="2400" dirty="0" err="1">
+                <a:solidFill>
+                  <a:schemeClr val="bg1">
+                    <a:lumMod val="65000"/>
+                  </a:schemeClr>
+                </a:solidFill>
+                <a:latin typeface="Courier" pitchFamily="2" charset="0"/>
+              </a:rPr>
+              <a:t>HttpClient</a:t>
+            </a:r>
+            <a:br>
+              <a:rPr lang="en-US" sz="2400" dirty="0">
+                <a:solidFill>
+                  <a:schemeClr val="bg1">
+                    <a:lumMod val="65000"/>
+                  </a:schemeClr>
+                </a:solidFill>
+                <a:latin typeface="Courier" pitchFamily="2" charset="0"/>
+              </a:rPr>
+            </a:br>
+            <a:r>
+              <a:rPr lang="en-US" sz="2400" dirty="0">
+                <a:latin typeface="Courier" pitchFamily="2" charset="0"/>
+              </a:rPr>
+              <a:t>   </a:t>
+            </a:r>
+            <a:r>
+              <a:rPr lang="en-US" sz="2400" b="1" dirty="0" err="1">
+                <a:solidFill>
+                  <a:schemeClr val="accent1">
+                    <a:lumMod val="75000"/>
+                  </a:schemeClr>
+                </a:solidFill>
+                <a:latin typeface="Courier" pitchFamily="2" charset="0"/>
+              </a:rPr>
+              <a:t>httpTestingController.expectOne</a:t>
+            </a:r>
+            <a:r>
+              <a:rPr lang="en-US" sz="2400" dirty="0">
+                <a:latin typeface="Courier" pitchFamily="2" charset="0"/>
+              </a:rPr>
+              <a:t>(</a:t>
+            </a:r>
+            <a:r>
+              <a:rPr lang="en-US" sz="2400" dirty="0" err="1">
+                <a:latin typeface="Courier" pitchFamily="2" charset="0"/>
+              </a:rPr>
+              <a:t>expectedUrl</a:t>
+            </a:r>
+            <a:r>
+              <a:rPr lang="en-US" sz="2400" dirty="0">
+                <a:latin typeface="Courier" pitchFamily="2" charset="0"/>
+              </a:rPr>
+              <a:t>)</a:t>
+            </a:r>
+            <a:br>
+              <a:rPr lang="en-US" sz="2400" dirty="0">
+                <a:latin typeface="Courier" pitchFamily="2" charset="0"/>
+              </a:rPr>
+            </a:br>
+            <a:r>
+              <a:rPr lang="en-US" sz="2400" dirty="0">
+                <a:latin typeface="Courier" pitchFamily="2" charset="0"/>
+              </a:rPr>
+              <a:t>     </a:t>
+            </a:r>
+            <a:r>
+              <a:rPr lang="en-US" sz="2400" b="1" dirty="0">
+                <a:solidFill>
+                  <a:schemeClr val="accent1">
+                    <a:lumMod val="75000"/>
+                  </a:schemeClr>
+                </a:solidFill>
+                <a:latin typeface="Courier" pitchFamily="2" charset="0"/>
+              </a:rPr>
+              <a:t>.flush</a:t>
+            </a:r>
+            <a:r>
+              <a:rPr lang="en-US" sz="2400" dirty="0">
+                <a:latin typeface="Courier" pitchFamily="2" charset="0"/>
+              </a:rPr>
+              <a:t>(</a:t>
+            </a:r>
+            <a:r>
+              <a:rPr lang="en-US" sz="2400" dirty="0" err="1">
+                <a:latin typeface="Courier" pitchFamily="2" charset="0"/>
+              </a:rPr>
+              <a:t>featureCollection</a:t>
+            </a:r>
+            <a:r>
+              <a:rPr lang="en-US" sz="2400" dirty="0">
+                <a:latin typeface="Courier" pitchFamily="2" charset="0"/>
+              </a:rPr>
+              <a:t>);</a:t>
+            </a:r>
+            <a:br>
+              <a:rPr lang="en-US" sz="2400" dirty="0">
+                <a:latin typeface="Courier" pitchFamily="2" charset="0"/>
+              </a:rPr>
+            </a:br>
+            <a:r>
+              <a:rPr lang="en-US" sz="2400" dirty="0">
+                <a:latin typeface="Courier" pitchFamily="2" charset="0"/>
+              </a:rPr>
+              <a:t>});</a:t>
+            </a:r>
+          </a:p>
+        </p:txBody>
+      </p:sp>
+    </p:spTree>
+    <p:extLst>
+      <p:ext uri="{BB962C8B-B14F-4D97-AF65-F5344CB8AC3E}">
+        <p14:creationId xmlns:p14="http://schemas.microsoft.com/office/powerpoint/2010/main" val="1494877104"/>
+      </p:ext>
+    </p:extLst>
+  </p:cSld>
+  <p:clrMapOvr>
+    <a:masterClrMapping/>
+  </p:clrMapOvr>
 </p:sld>
 </file>
 

</xml_diff>